<commit_message>
📊 PPT Evaluación Mensual generado - 2026-02
</commit_message>
<xml_diff>
--- a/data/sentinel2/Llaima/reportes/Llaima_Evaluacion_Mensual_2026-01.pptx
+++ b/data/sentinel2/Llaima/reportes/Llaima_Evaluacion_Mensual_2026-01.pptx
@@ -3589,7 +3589,7 @@
         </p:spPr>
         <p:txBody>
           <a:bodyPr vert="horz" lIns="91440" tIns="45720" rIns="91440" bIns="45720" rtlCol="0">
-            <a:normAutofit fontScale="92500" lnSpcReduction="20000"/>
+            <a:normAutofit fontScale="62500" lnSpcReduction="20000"/>
           </a:bodyPr>
           <a:lstStyle>
             <a:lvl1pPr marL="0" indent="0" algn="l" defTabSz="914400" rtl="0" eaLnBrk="1" latinLnBrk="0" hangingPunct="1">
@@ -3773,8 +3773,12 @@
           </a:lstStyle>
           <a:p>
             <a:r>
+              <a:rPr lang="es-CL" dirty="0" err="1"/>
+              <a:t>Sentinel</a:t>
+            </a:r>
+            <a:r>
               <a:rPr lang="es-CL" dirty="0"/>
-              <a:t>Cambios Morfológicos - Llaima</a:t>
+              <a:t> - Cambios Morfológicos y anomalías térmicas</a:t>
             </a:r>
           </a:p>
         </p:txBody>
@@ -4041,11 +4045,24 @@
           <a:p>
             <a:pPr algn="ctr"/>
             <a:r>
-              <a:t>Imágenes Sentinel 2 L2A color verdadero</a:t>
-            </a:r>
-            <a:br/>
-            <a:r>
-              <a:t>Time Lapse 02 enero – 29 enero 2026</a:t>
+              <a:rPr lang="es-MX" sz="1200" dirty="0"/>
+              <a:t>Imágenes </a:t>
+            </a:r>
+            <a:r>
+              <a:rPr lang="es-MX" sz="1200" dirty="0" err="1"/>
+              <a:t>Sentinel</a:t>
+            </a:r>
+            <a:r>
+              <a:rPr lang="es-MX" sz="1200" dirty="0"/>
+              <a:t> 2 L2A </a:t>
+            </a:r>
+            <a:r>
+              <a:rPr lang="es-MX" sz="1200"/>
+              <a:t>color verdadero, </a:t>
+            </a:r>
+            <a:r>
+              <a:rPr lang="es-MX" sz="1200" dirty="0"/>
+              <a:t>Time Lapse 02 diciembre – 30 diciembre 2025</a:t>
             </a:r>
           </a:p>
         </p:txBody>
@@ -4080,11 +4097,16 @@
           <a:p>
             <a:pPr algn="ctr"/>
             <a:r>
-              <a:t>Imágenes Sentinel 2 L2A falso color térmico</a:t>
-            </a:r>
-            <a:br/>
-            <a:r>
-              <a:t>Time Lapse 02 enero – 29 enero 2026</a:t>
+              <a:rPr lang="es-MX" sz="1200" dirty="0"/>
+              <a:t>Imágenes </a:t>
+            </a:r>
+            <a:r>
+              <a:rPr lang="es-MX" sz="1200" dirty="0" err="1"/>
+              <a:t>Sentinel</a:t>
+            </a:r>
+            <a:r>
+              <a:rPr lang="es-MX" sz="1200" dirty="0"/>
+              <a:t> 2 L2A Falso color, Time Lapse 02 diciembre – 30 diciembre 2025</a:t>
             </a:r>
           </a:p>
         </p:txBody>

</xml_diff>